<commit_message>
adicionado arquivos palestras SOAP
</commit_message>
<xml_diff>
--- a/materiais/pentaho_SOAP.pptx
+++ b/materiais/pentaho_SOAP.pptx
@@ -21,11 +21,12 @@
     <p:sldId id="269" r:id="rId15"/>
     <p:sldId id="271" r:id="rId16"/>
     <p:sldId id="270" r:id="rId17"/>
-    <p:sldId id="280" r:id="rId18"/>
-    <p:sldId id="281" r:id="rId19"/>
-    <p:sldId id="278" r:id="rId20"/>
-    <p:sldId id="272" r:id="rId21"/>
-    <p:sldId id="279" r:id="rId22"/>
+    <p:sldId id="282" r:id="rId18"/>
+    <p:sldId id="280" r:id="rId19"/>
+    <p:sldId id="281" r:id="rId20"/>
+    <p:sldId id="278" r:id="rId21"/>
+    <p:sldId id="272" r:id="rId22"/>
+    <p:sldId id="279" r:id="rId23"/>
   </p:sldIdLst>
   <p:sldSz cx="12192000" cy="6858000"/>
   <p:notesSz cx="6858000" cy="9144000"/>
@@ -263,7 +264,7 @@
           <a:p>
             <a:fld id="{73838961-7E16-4F4D-85FA-2DC200145252}" type="datetimeFigureOut">
               <a:rPr lang="pt-BR" smtClean="0"/>
-              <a:t>07/05/2017</a:t>
+              <a:t>11/05/2017</a:t>
             </a:fld>
             <a:endParaRPr lang="pt-BR"/>
           </a:p>
@@ -321,6 +322,18 @@
   <p:clrMapOvr>
     <a:masterClrMapping/>
   </p:clrMapOvr>
+  <mc:AlternateContent xmlns:mc="http://schemas.openxmlformats.org/markup-compatibility/2006" xmlns:p14="http://schemas.microsoft.com/office/powerpoint/2010/main">
+    <mc:Choice Requires="p14">
+      <p:transition spd="med" p14:dur="700">
+        <p:fade/>
+      </p:transition>
+    </mc:Choice>
+    <mc:Fallback xmlns="">
+      <p:transition spd="med">
+        <p:fade/>
+      </p:transition>
+    </mc:Fallback>
+  </mc:AlternateContent>
 </p:sldLayout>
 </file>
 
@@ -433,7 +446,7 @@
           <a:p>
             <a:fld id="{73838961-7E16-4F4D-85FA-2DC200145252}" type="datetimeFigureOut">
               <a:rPr lang="pt-BR" smtClean="0"/>
-              <a:t>07/05/2017</a:t>
+              <a:t>11/05/2017</a:t>
             </a:fld>
             <a:endParaRPr lang="pt-BR"/>
           </a:p>
@@ -491,6 +504,18 @@
   <p:clrMapOvr>
     <a:masterClrMapping/>
   </p:clrMapOvr>
+  <mc:AlternateContent xmlns:mc="http://schemas.openxmlformats.org/markup-compatibility/2006" xmlns:p14="http://schemas.microsoft.com/office/powerpoint/2010/main">
+    <mc:Choice Requires="p14">
+      <p:transition spd="med" p14:dur="700">
+        <p:fade/>
+      </p:transition>
+    </mc:Choice>
+    <mc:Fallback xmlns="">
+      <p:transition spd="med">
+        <p:fade/>
+      </p:transition>
+    </mc:Fallback>
+  </mc:AlternateContent>
 </p:sldLayout>
 </file>
 
@@ -613,7 +638,7 @@
           <a:p>
             <a:fld id="{73838961-7E16-4F4D-85FA-2DC200145252}" type="datetimeFigureOut">
               <a:rPr lang="pt-BR" smtClean="0"/>
-              <a:t>07/05/2017</a:t>
+              <a:t>11/05/2017</a:t>
             </a:fld>
             <a:endParaRPr lang="pt-BR"/>
           </a:p>
@@ -671,6 +696,18 @@
   <p:clrMapOvr>
     <a:masterClrMapping/>
   </p:clrMapOvr>
+  <mc:AlternateContent xmlns:mc="http://schemas.openxmlformats.org/markup-compatibility/2006" xmlns:p14="http://schemas.microsoft.com/office/powerpoint/2010/main">
+    <mc:Choice Requires="p14">
+      <p:transition spd="med" p14:dur="700">
+        <p:fade/>
+      </p:transition>
+    </mc:Choice>
+    <mc:Fallback xmlns="">
+      <p:transition spd="med">
+        <p:fade/>
+      </p:transition>
+    </mc:Fallback>
+  </mc:AlternateContent>
 </p:sldLayout>
 </file>
 
@@ -783,7 +820,7 @@
           <a:p>
             <a:fld id="{73838961-7E16-4F4D-85FA-2DC200145252}" type="datetimeFigureOut">
               <a:rPr lang="pt-BR" smtClean="0"/>
-              <a:t>07/05/2017</a:t>
+              <a:t>11/05/2017</a:t>
             </a:fld>
             <a:endParaRPr lang="pt-BR"/>
           </a:p>
@@ -841,6 +878,18 @@
   <p:clrMapOvr>
     <a:masterClrMapping/>
   </p:clrMapOvr>
+  <mc:AlternateContent xmlns:mc="http://schemas.openxmlformats.org/markup-compatibility/2006" xmlns:p14="http://schemas.microsoft.com/office/powerpoint/2010/main">
+    <mc:Choice Requires="p14">
+      <p:transition spd="med" p14:dur="700">
+        <p:fade/>
+      </p:transition>
+    </mc:Choice>
+    <mc:Fallback xmlns="">
+      <p:transition spd="med">
+        <p:fade/>
+      </p:transition>
+    </mc:Fallback>
+  </mc:AlternateContent>
 </p:sldLayout>
 </file>
 
@@ -1029,7 +1078,7 @@
           <a:p>
             <a:fld id="{73838961-7E16-4F4D-85FA-2DC200145252}" type="datetimeFigureOut">
               <a:rPr lang="pt-BR" smtClean="0"/>
-              <a:t>07/05/2017</a:t>
+              <a:t>11/05/2017</a:t>
             </a:fld>
             <a:endParaRPr lang="pt-BR"/>
           </a:p>
@@ -1087,6 +1136,18 @@
   <p:clrMapOvr>
     <a:masterClrMapping/>
   </p:clrMapOvr>
+  <mc:AlternateContent xmlns:mc="http://schemas.openxmlformats.org/markup-compatibility/2006" xmlns:p14="http://schemas.microsoft.com/office/powerpoint/2010/main">
+    <mc:Choice Requires="p14">
+      <p:transition spd="med" p14:dur="700">
+        <p:fade/>
+      </p:transition>
+    </mc:Choice>
+    <mc:Fallback xmlns="">
+      <p:transition spd="med">
+        <p:fade/>
+      </p:transition>
+    </mc:Fallback>
+  </mc:AlternateContent>
 </p:sldLayout>
 </file>
 
@@ -1261,7 +1322,7 @@
           <a:p>
             <a:fld id="{73838961-7E16-4F4D-85FA-2DC200145252}" type="datetimeFigureOut">
               <a:rPr lang="pt-BR" smtClean="0"/>
-              <a:t>07/05/2017</a:t>
+              <a:t>11/05/2017</a:t>
             </a:fld>
             <a:endParaRPr lang="pt-BR"/>
           </a:p>
@@ -1319,6 +1380,18 @@
   <p:clrMapOvr>
     <a:masterClrMapping/>
   </p:clrMapOvr>
+  <mc:AlternateContent xmlns:mc="http://schemas.openxmlformats.org/markup-compatibility/2006" xmlns:p14="http://schemas.microsoft.com/office/powerpoint/2010/main">
+    <mc:Choice Requires="p14">
+      <p:transition spd="med" p14:dur="700">
+        <p:fade/>
+      </p:transition>
+    </mc:Choice>
+    <mc:Fallback xmlns="">
+      <p:transition spd="med">
+        <p:fade/>
+      </p:transition>
+    </mc:Fallback>
+  </mc:AlternateContent>
 </p:sldLayout>
 </file>
 
@@ -1628,7 +1701,7 @@
           <a:p>
             <a:fld id="{73838961-7E16-4F4D-85FA-2DC200145252}" type="datetimeFigureOut">
               <a:rPr lang="pt-BR" smtClean="0"/>
-              <a:t>07/05/2017</a:t>
+              <a:t>11/05/2017</a:t>
             </a:fld>
             <a:endParaRPr lang="pt-BR"/>
           </a:p>
@@ -1686,6 +1759,18 @@
   <p:clrMapOvr>
     <a:masterClrMapping/>
   </p:clrMapOvr>
+  <mc:AlternateContent xmlns:mc="http://schemas.openxmlformats.org/markup-compatibility/2006" xmlns:p14="http://schemas.microsoft.com/office/powerpoint/2010/main">
+    <mc:Choice Requires="p14">
+      <p:transition spd="med" p14:dur="700">
+        <p:fade/>
+      </p:transition>
+    </mc:Choice>
+    <mc:Fallback xmlns="">
+      <p:transition spd="med">
+        <p:fade/>
+      </p:transition>
+    </mc:Fallback>
+  </mc:AlternateContent>
 </p:sldLayout>
 </file>
 
@@ -1746,7 +1831,7 @@
           <a:p>
             <a:fld id="{73838961-7E16-4F4D-85FA-2DC200145252}" type="datetimeFigureOut">
               <a:rPr lang="pt-BR" smtClean="0"/>
-              <a:t>07/05/2017</a:t>
+              <a:t>11/05/2017</a:t>
             </a:fld>
             <a:endParaRPr lang="pt-BR"/>
           </a:p>
@@ -1804,6 +1889,18 @@
   <p:clrMapOvr>
     <a:masterClrMapping/>
   </p:clrMapOvr>
+  <mc:AlternateContent xmlns:mc="http://schemas.openxmlformats.org/markup-compatibility/2006" xmlns:p14="http://schemas.microsoft.com/office/powerpoint/2010/main">
+    <mc:Choice Requires="p14">
+      <p:transition spd="med" p14:dur="700">
+        <p:fade/>
+      </p:transition>
+    </mc:Choice>
+    <mc:Fallback xmlns="">
+      <p:transition spd="med">
+        <p:fade/>
+      </p:transition>
+    </mc:Fallback>
+  </mc:AlternateContent>
 </p:sldLayout>
 </file>
 
@@ -1841,7 +1938,7 @@
           <a:p>
             <a:fld id="{73838961-7E16-4F4D-85FA-2DC200145252}" type="datetimeFigureOut">
               <a:rPr lang="pt-BR" smtClean="0"/>
-              <a:t>07/05/2017</a:t>
+              <a:t>11/05/2017</a:t>
             </a:fld>
             <a:endParaRPr lang="pt-BR"/>
           </a:p>
@@ -1899,6 +1996,18 @@
   <p:clrMapOvr>
     <a:masterClrMapping/>
   </p:clrMapOvr>
+  <mc:AlternateContent xmlns:mc="http://schemas.openxmlformats.org/markup-compatibility/2006" xmlns:p14="http://schemas.microsoft.com/office/powerpoint/2010/main">
+    <mc:Choice Requires="p14">
+      <p:transition spd="med" p14:dur="700">
+        <p:fade/>
+      </p:transition>
+    </mc:Choice>
+    <mc:Fallback xmlns="">
+      <p:transition spd="med">
+        <p:fade/>
+      </p:transition>
+    </mc:Fallback>
+  </mc:AlternateContent>
 </p:sldLayout>
 </file>
 
@@ -2118,7 +2227,7 @@
           <a:p>
             <a:fld id="{73838961-7E16-4F4D-85FA-2DC200145252}" type="datetimeFigureOut">
               <a:rPr lang="pt-BR" smtClean="0"/>
-              <a:t>07/05/2017</a:t>
+              <a:t>11/05/2017</a:t>
             </a:fld>
             <a:endParaRPr lang="pt-BR"/>
           </a:p>
@@ -2176,6 +2285,18 @@
   <p:clrMapOvr>
     <a:masterClrMapping/>
   </p:clrMapOvr>
+  <mc:AlternateContent xmlns:mc="http://schemas.openxmlformats.org/markup-compatibility/2006" xmlns:p14="http://schemas.microsoft.com/office/powerpoint/2010/main">
+    <mc:Choice Requires="p14">
+      <p:transition spd="med" p14:dur="700">
+        <p:fade/>
+      </p:transition>
+    </mc:Choice>
+    <mc:Fallback xmlns="">
+      <p:transition spd="med">
+        <p:fade/>
+      </p:transition>
+    </mc:Fallback>
+  </mc:AlternateContent>
 </p:sldLayout>
 </file>
 
@@ -2371,7 +2492,7 @@
           <a:p>
             <a:fld id="{73838961-7E16-4F4D-85FA-2DC200145252}" type="datetimeFigureOut">
               <a:rPr lang="pt-BR" smtClean="0"/>
-              <a:t>07/05/2017</a:t>
+              <a:t>11/05/2017</a:t>
             </a:fld>
             <a:endParaRPr lang="pt-BR"/>
           </a:p>
@@ -2429,6 +2550,18 @@
   <p:clrMapOvr>
     <a:masterClrMapping/>
   </p:clrMapOvr>
+  <mc:AlternateContent xmlns:mc="http://schemas.openxmlformats.org/markup-compatibility/2006" xmlns:p14="http://schemas.microsoft.com/office/powerpoint/2010/main">
+    <mc:Choice Requires="p14">
+      <p:transition spd="med" p14:dur="700">
+        <p:fade/>
+      </p:transition>
+    </mc:Choice>
+    <mc:Fallback xmlns="">
+      <p:transition spd="med">
+        <p:fade/>
+      </p:transition>
+    </mc:Fallback>
+  </mc:AlternateContent>
 </p:sldLayout>
 </file>
 
@@ -2436,9 +2569,19 @@
 <p:sldMaster xmlns:a="http://schemas.openxmlformats.org/drawingml/2006/main" xmlns:r="http://schemas.openxmlformats.org/officeDocument/2006/relationships" xmlns:p="http://schemas.openxmlformats.org/presentationml/2006/main">
   <p:cSld>
     <p:bg>
-      <p:bgRef idx="1001">
-        <a:schemeClr val="bg1"/>
-      </p:bgRef>
+      <p:bgPr>
+        <a:blipFill dpi="0" rotWithShape="1">
+          <a:blip r:embed="rId13">
+            <a:alphaModFix amt="22000"/>
+            <a:lum/>
+          </a:blip>
+          <a:srcRect/>
+          <a:stretch>
+            <a:fillRect/>
+          </a:stretch>
+        </a:blipFill>
+        <a:effectLst/>
+      </p:bgPr>
     </p:bg>
     <p:spTree>
       <p:nvGrpSpPr>
@@ -2584,7 +2727,7 @@
           <a:p>
             <a:fld id="{73838961-7E16-4F4D-85FA-2DC200145252}" type="datetimeFigureOut">
               <a:rPr lang="pt-BR" smtClean="0"/>
-              <a:t>07/05/2017</a:t>
+              <a:t>11/05/2017</a:t>
             </a:fld>
             <a:endParaRPr lang="pt-BR"/>
           </a:p>
@@ -2689,6 +2832,18 @@
     <p:sldLayoutId id="2147483658" r:id="rId10"/>
     <p:sldLayoutId id="2147483659" r:id="rId11"/>
   </p:sldLayoutIdLst>
+  <mc:AlternateContent xmlns:mc="http://schemas.openxmlformats.org/markup-compatibility/2006" xmlns:p14="http://schemas.microsoft.com/office/powerpoint/2010/main">
+    <mc:Choice Requires="p14">
+      <p:transition spd="med" p14:dur="700">
+        <p:fade/>
+      </p:transition>
+    </mc:Choice>
+    <mc:Fallback xmlns="">
+      <p:transition spd="med">
+        <p:fade/>
+      </p:transition>
+    </mc:Fallback>
+  </mc:AlternateContent>
   <p:txStyles>
     <p:titleStyle>
       <a:lvl1pPr algn="l" defTabSz="914400" rtl="0" eaLnBrk="1" latinLnBrk="0" hangingPunct="1">
@@ -2999,7 +3154,9 @@
             <p:ph type="ctrTitle"/>
           </p:nvPr>
         </p:nvSpPr>
-        <p:spPr/>
+        <p:spPr>
+          <a:noFill/>
+        </p:spPr>
         <p:txBody>
           <a:bodyPr>
             <a:normAutofit fontScale="90000"/>
@@ -3056,6 +3213,47 @@
           </a:p>
         </p:txBody>
       </p:sp>
+      <p:pic>
+        <p:nvPicPr>
+          <p:cNvPr id="1026" name="Picture 2" descr="Resultado de imagem para pentaho data integration"/>
+          <p:cNvPicPr>
+            <a:picLocks noChangeAspect="1" noChangeArrowheads="1"/>
+          </p:cNvPicPr>
+          <p:nvPr/>
+        </p:nvPicPr>
+        <p:blipFill>
+          <a:blip r:embed="rId2">
+            <a:extLst>
+              <a:ext uri="{28A0092B-C50C-407E-A947-70E740481C1C}">
+                <a14:useLocalDpi xmlns:a14="http://schemas.microsoft.com/office/drawing/2010/main" val="0"/>
+              </a:ext>
+            </a:extLst>
+          </a:blip>
+          <a:srcRect/>
+          <a:stretch>
+            <a:fillRect/>
+          </a:stretch>
+        </p:blipFill>
+        <p:spPr bwMode="auto">
+          <a:xfrm>
+            <a:off x="4648200" y="4732426"/>
+            <a:ext cx="2895600" cy="1581151"/>
+          </a:xfrm>
+          <a:prstGeom prst="rect">
+            <a:avLst/>
+          </a:prstGeom>
+          <a:noFill/>
+          <a:extLst>
+            <a:ext uri="{909E8E84-426E-40DD-AFC4-6F175D3DCCD1}">
+              <a14:hiddenFill xmlns:a14="http://schemas.microsoft.com/office/drawing/2010/main">
+                <a:solidFill>
+                  <a:srgbClr val="FFFFFF"/>
+                </a:solidFill>
+              </a14:hiddenFill>
+            </a:ext>
+          </a:extLst>
+        </p:spPr>
+      </p:pic>
     </p:spTree>
     <p:extLst>
       <p:ext uri="{BB962C8B-B14F-4D97-AF65-F5344CB8AC3E}">
@@ -3066,6 +3264,25 @@
   <p:clrMapOvr>
     <a:masterClrMapping/>
   </p:clrMapOvr>
+  <mc:AlternateContent xmlns:mc="http://schemas.openxmlformats.org/markup-compatibility/2006" xmlns:p14="http://schemas.microsoft.com/office/powerpoint/2010/main">
+    <mc:Choice Requires="p14">
+      <p:transition spd="med" p14:dur="700">
+        <p:fade/>
+      </p:transition>
+    </mc:Choice>
+    <mc:Fallback xmlns="">
+      <p:transition spd="med">
+        <p:fade/>
+      </p:transition>
+    </mc:Fallback>
+  </mc:AlternateContent>
+  <p:timing>
+    <p:tnLst>
+      <p:par>
+        <p:cTn id="1" dur="indefinite" restart="never" nodeType="tmRoot"/>
+      </p:par>
+    </p:tnLst>
+  </p:timing>
 </p:sld>
 </file>
 
@@ -3149,6 +3366,25 @@
   <p:clrMapOvr>
     <a:masterClrMapping/>
   </p:clrMapOvr>
+  <mc:AlternateContent xmlns:mc="http://schemas.openxmlformats.org/markup-compatibility/2006" xmlns:p14="http://schemas.microsoft.com/office/powerpoint/2010/main">
+    <mc:Choice Requires="p14">
+      <p:transition spd="med" p14:dur="700">
+        <p:fade/>
+      </p:transition>
+    </mc:Choice>
+    <mc:Fallback xmlns="">
+      <p:transition spd="med">
+        <p:fade/>
+      </p:transition>
+    </mc:Fallback>
+  </mc:AlternateContent>
+  <p:timing>
+    <p:tnLst>
+      <p:par>
+        <p:cTn id="1" dur="indefinite" restart="never" nodeType="tmRoot"/>
+      </p:par>
+    </p:tnLst>
+  </p:timing>
 </p:sld>
 </file>
 
@@ -3260,6 +3496,25 @@
   <p:clrMapOvr>
     <a:masterClrMapping/>
   </p:clrMapOvr>
+  <mc:AlternateContent xmlns:mc="http://schemas.openxmlformats.org/markup-compatibility/2006" xmlns:p14="http://schemas.microsoft.com/office/powerpoint/2010/main">
+    <mc:Choice Requires="p14">
+      <p:transition spd="med" p14:dur="700">
+        <p:fade/>
+      </p:transition>
+    </mc:Choice>
+    <mc:Fallback xmlns="">
+      <p:transition spd="med">
+        <p:fade/>
+      </p:transition>
+    </mc:Fallback>
+  </mc:AlternateContent>
+  <p:timing>
+    <p:tnLst>
+      <p:par>
+        <p:cTn id="1" dur="indefinite" restart="never" nodeType="tmRoot"/>
+      </p:par>
+    </p:tnLst>
+  </p:timing>
 </p:sld>
 </file>
 
@@ -3410,6 +3665,25 @@
   <p:clrMapOvr>
     <a:masterClrMapping/>
   </p:clrMapOvr>
+  <mc:AlternateContent xmlns:mc="http://schemas.openxmlformats.org/markup-compatibility/2006" xmlns:p14="http://schemas.microsoft.com/office/powerpoint/2010/main">
+    <mc:Choice Requires="p14">
+      <p:transition spd="med" p14:dur="700">
+        <p:fade/>
+      </p:transition>
+    </mc:Choice>
+    <mc:Fallback xmlns="">
+      <p:transition spd="med">
+        <p:fade/>
+      </p:transition>
+    </mc:Fallback>
+  </mc:AlternateContent>
+  <p:timing>
+    <p:tnLst>
+      <p:par>
+        <p:cTn id="1" dur="indefinite" restart="never" nodeType="tmRoot"/>
+      </p:par>
+    </p:tnLst>
+  </p:timing>
 </p:sld>
 </file>
 
@@ -3519,6 +3793,25 @@
   <p:clrMapOvr>
     <a:masterClrMapping/>
   </p:clrMapOvr>
+  <mc:AlternateContent xmlns:mc="http://schemas.openxmlformats.org/markup-compatibility/2006" xmlns:p14="http://schemas.microsoft.com/office/powerpoint/2010/main">
+    <mc:Choice Requires="p14">
+      <p:transition spd="med" p14:dur="700">
+        <p:fade/>
+      </p:transition>
+    </mc:Choice>
+    <mc:Fallback xmlns="">
+      <p:transition spd="med">
+        <p:fade/>
+      </p:transition>
+    </mc:Fallback>
+  </mc:AlternateContent>
+  <p:timing>
+    <p:tnLst>
+      <p:par>
+        <p:cTn id="1" dur="indefinite" restart="never" nodeType="tmRoot"/>
+      </p:par>
+    </p:tnLst>
+  </p:timing>
 </p:sld>
 </file>
 
@@ -3604,6 +3897,25 @@
   <p:clrMapOvr>
     <a:masterClrMapping/>
   </p:clrMapOvr>
+  <mc:AlternateContent xmlns:mc="http://schemas.openxmlformats.org/markup-compatibility/2006" xmlns:p14="http://schemas.microsoft.com/office/powerpoint/2010/main">
+    <mc:Choice Requires="p14">
+      <p:transition spd="med" p14:dur="700">
+        <p:fade/>
+      </p:transition>
+    </mc:Choice>
+    <mc:Fallback xmlns="">
+      <p:transition spd="med">
+        <p:fade/>
+      </p:transition>
+    </mc:Fallback>
+  </mc:AlternateContent>
+  <p:timing>
+    <p:tnLst>
+      <p:par>
+        <p:cTn id="1" dur="indefinite" restart="never" nodeType="tmRoot"/>
+      </p:par>
+    </p:tnLst>
+  </p:timing>
 </p:sld>
 </file>
 
@@ -3689,6 +4001,25 @@
   <p:clrMapOvr>
     <a:masterClrMapping/>
   </p:clrMapOvr>
+  <mc:AlternateContent xmlns:mc="http://schemas.openxmlformats.org/markup-compatibility/2006" xmlns:p14="http://schemas.microsoft.com/office/powerpoint/2010/main">
+    <mc:Choice Requires="p14">
+      <p:transition spd="med" p14:dur="700">
+        <p:fade/>
+      </p:transition>
+    </mc:Choice>
+    <mc:Fallback xmlns="">
+      <p:transition spd="med">
+        <p:fade/>
+      </p:transition>
+    </mc:Fallback>
+  </mc:AlternateContent>
+  <p:timing>
+    <p:tnLst>
+      <p:par>
+        <p:cTn id="1" dur="indefinite" restart="never" nodeType="tmRoot"/>
+      </p:par>
+    </p:tnLst>
+  </p:timing>
 </p:sld>
 </file>
 
@@ -3800,10 +4131,149 @@
   <p:clrMapOvr>
     <a:masterClrMapping/>
   </p:clrMapOvr>
+  <mc:AlternateContent xmlns:mc="http://schemas.openxmlformats.org/markup-compatibility/2006" xmlns:p14="http://schemas.microsoft.com/office/powerpoint/2010/main">
+    <mc:Choice Requires="p14">
+      <p:transition spd="med" p14:dur="700">
+        <p:fade/>
+      </p:transition>
+    </mc:Choice>
+    <mc:Fallback xmlns="">
+      <p:transition spd="med">
+        <p:fade/>
+      </p:transition>
+    </mc:Fallback>
+  </mc:AlternateContent>
+  <p:timing>
+    <p:tnLst>
+      <p:par>
+        <p:cTn id="1" dur="indefinite" restart="never" nodeType="tmRoot"/>
+      </p:par>
+    </p:tnLst>
+  </p:timing>
 </p:sld>
 </file>
 
 <file path=ppt/slides/slide17.xml><?xml version="1.0" encoding="utf-8"?>
+<p:sld xmlns:a="http://schemas.openxmlformats.org/drawingml/2006/main" xmlns:r="http://schemas.openxmlformats.org/officeDocument/2006/relationships" xmlns:p="http://schemas.openxmlformats.org/presentationml/2006/main">
+  <p:cSld>
+    <p:spTree>
+      <p:nvGrpSpPr>
+        <p:cNvPr id="1" name=""/>
+        <p:cNvGrpSpPr/>
+        <p:nvPr/>
+      </p:nvGrpSpPr>
+      <p:grpSpPr>
+        <a:xfrm>
+          <a:off x="0" y="0"/>
+          <a:ext cx="0" cy="0"/>
+          <a:chOff x="0" y="0"/>
+          <a:chExt cx="0" cy="0"/>
+        </a:xfrm>
+      </p:grpSpPr>
+      <p:sp>
+        <p:nvSpPr>
+          <p:cNvPr id="2" name="Título 1"/>
+          <p:cNvSpPr>
+            <a:spLocks noGrp="1"/>
+          </p:cNvSpPr>
+          <p:nvPr>
+            <p:ph type="title"/>
+          </p:nvPr>
+        </p:nvSpPr>
+        <p:spPr/>
+        <p:txBody>
+          <a:bodyPr/>
+          <a:lstStyle/>
+          <a:p>
+            <a:r>
+              <a:rPr lang="pt-BR" b="1" dirty="0" smtClean="0"/>
+              <a:t>Input / Output</a:t>
+            </a:r>
+            <a:endParaRPr lang="pt-BR" b="1" dirty="0"/>
+          </a:p>
+        </p:txBody>
+      </p:sp>
+      <p:pic>
+        <p:nvPicPr>
+          <p:cNvPr id="4" name="Imagem 3"/>
+          <p:cNvPicPr>
+            <a:picLocks noChangeAspect="1"/>
+          </p:cNvPicPr>
+          <p:nvPr/>
+        </p:nvPicPr>
+        <p:blipFill>
+          <a:blip r:embed="rId2"/>
+          <a:stretch>
+            <a:fillRect/>
+          </a:stretch>
+        </p:blipFill>
+        <p:spPr>
+          <a:xfrm>
+            <a:off x="838200" y="1690688"/>
+            <a:ext cx="5730025" cy="2349853"/>
+          </a:xfrm>
+          <a:prstGeom prst="rect">
+            <a:avLst/>
+          </a:prstGeom>
+        </p:spPr>
+      </p:pic>
+      <p:pic>
+        <p:nvPicPr>
+          <p:cNvPr id="5" name="Imagem 4"/>
+          <p:cNvPicPr>
+            <a:picLocks noChangeAspect="1"/>
+          </p:cNvPicPr>
+          <p:nvPr/>
+        </p:nvPicPr>
+        <p:blipFill>
+          <a:blip r:embed="rId3"/>
+          <a:stretch>
+            <a:fillRect/>
+          </a:stretch>
+        </p:blipFill>
+        <p:spPr>
+          <a:xfrm>
+            <a:off x="838200" y="4135124"/>
+            <a:ext cx="8266967" cy="1724763"/>
+          </a:xfrm>
+          <a:prstGeom prst="rect">
+            <a:avLst/>
+          </a:prstGeom>
+        </p:spPr>
+      </p:pic>
+    </p:spTree>
+    <p:extLst>
+      <p:ext uri="{BB962C8B-B14F-4D97-AF65-F5344CB8AC3E}">
+        <p14:creationId xmlns:p14="http://schemas.microsoft.com/office/powerpoint/2010/main" val="4264980708"/>
+      </p:ext>
+    </p:extLst>
+  </p:cSld>
+  <p:clrMapOvr>
+    <a:masterClrMapping/>
+  </p:clrMapOvr>
+  <mc:AlternateContent xmlns:mc="http://schemas.openxmlformats.org/markup-compatibility/2006" xmlns:p14="http://schemas.microsoft.com/office/powerpoint/2010/main">
+    <mc:Choice Requires="p14">
+      <p:transition spd="med" p14:dur="700">
+        <p:fade/>
+      </p:transition>
+    </mc:Choice>
+    <mc:Fallback xmlns="">
+      <p:transition spd="med">
+        <p:fade/>
+      </p:transition>
+    </mc:Fallback>
+  </mc:AlternateContent>
+  <p:timing>
+    <p:tnLst>
+      <p:par>
+        <p:cTn id="1" dur="indefinite" restart="never" nodeType="tmRoot"/>
+      </p:par>
+    </p:tnLst>
+  </p:timing>
+</p:sld>
+</file>
+
+<file path=ppt/slides/slide18.xml><?xml version="1.0" encoding="utf-8"?>
 <p:sld xmlns:a="http://schemas.openxmlformats.org/drawingml/2006/main" xmlns:r="http://schemas.openxmlformats.org/officeDocument/2006/relationships" xmlns:p="http://schemas.openxmlformats.org/presentationml/2006/main">
   <p:cSld>
     <p:spTree>
@@ -3885,10 +4355,29 @@
   <p:clrMapOvr>
     <a:masterClrMapping/>
   </p:clrMapOvr>
+  <mc:AlternateContent xmlns:mc="http://schemas.openxmlformats.org/markup-compatibility/2006" xmlns:p14="http://schemas.microsoft.com/office/powerpoint/2010/main">
+    <mc:Choice Requires="p14">
+      <p:transition spd="med" p14:dur="700">
+        <p:fade/>
+      </p:transition>
+    </mc:Choice>
+    <mc:Fallback xmlns="">
+      <p:transition spd="med">
+        <p:fade/>
+      </p:transition>
+    </mc:Fallback>
+  </mc:AlternateContent>
+  <p:timing>
+    <p:tnLst>
+      <p:par>
+        <p:cTn id="1" dur="indefinite" restart="never" nodeType="tmRoot"/>
+      </p:par>
+    </p:tnLst>
+  </p:timing>
 </p:sld>
 </file>
 
-<file path=ppt/slides/slide18.xml><?xml version="1.0" encoding="utf-8"?>
+<file path=ppt/slides/slide19.xml><?xml version="1.0" encoding="utf-8"?>
 <p:sld xmlns:a="http://schemas.openxmlformats.org/drawingml/2006/main" xmlns:r="http://schemas.openxmlformats.org/officeDocument/2006/relationships" xmlns:p="http://schemas.openxmlformats.org/presentationml/2006/main">
   <p:cSld>
     <p:spTree>
@@ -3970,10 +4459,203 @@
   <p:clrMapOvr>
     <a:masterClrMapping/>
   </p:clrMapOvr>
+  <mc:AlternateContent xmlns:mc="http://schemas.openxmlformats.org/markup-compatibility/2006" xmlns:p14="http://schemas.microsoft.com/office/powerpoint/2010/main">
+    <mc:Choice Requires="p14">
+      <p:transition spd="med" p14:dur="700">
+        <p:fade/>
+      </p:transition>
+    </mc:Choice>
+    <mc:Fallback xmlns="">
+      <p:transition spd="med">
+        <p:fade/>
+      </p:transition>
+    </mc:Fallback>
+  </mc:AlternateContent>
+  <p:timing>
+    <p:tnLst>
+      <p:par>
+        <p:cTn id="1" dur="indefinite" restart="never" nodeType="tmRoot"/>
+      </p:par>
+    </p:tnLst>
+  </p:timing>
 </p:sld>
 </file>
 
-<file path=ppt/slides/slide19.xml><?xml version="1.0" encoding="utf-8"?>
+<file path=ppt/slides/slide2.xml><?xml version="1.0" encoding="utf-8"?>
+<p:sld xmlns:a="http://schemas.openxmlformats.org/drawingml/2006/main" xmlns:r="http://schemas.openxmlformats.org/officeDocument/2006/relationships" xmlns:p="http://schemas.openxmlformats.org/presentationml/2006/main">
+  <p:cSld>
+    <p:spTree>
+      <p:nvGrpSpPr>
+        <p:cNvPr id="1" name=""/>
+        <p:cNvGrpSpPr/>
+        <p:nvPr/>
+      </p:nvGrpSpPr>
+      <p:grpSpPr>
+        <a:xfrm>
+          <a:off x="0" y="0"/>
+          <a:ext cx="0" cy="0"/>
+          <a:chOff x="0" y="0"/>
+          <a:chExt cx="0" cy="0"/>
+        </a:xfrm>
+      </p:grpSpPr>
+      <p:sp>
+        <p:nvSpPr>
+          <p:cNvPr id="2" name="Título 1"/>
+          <p:cNvSpPr>
+            <a:spLocks noGrp="1"/>
+          </p:cNvSpPr>
+          <p:nvPr>
+            <p:ph type="title"/>
+          </p:nvPr>
+        </p:nvSpPr>
+        <p:spPr/>
+        <p:txBody>
+          <a:bodyPr/>
+          <a:lstStyle/>
+          <a:p>
+            <a:r>
+              <a:rPr lang="pt-BR" dirty="0" smtClean="0"/>
+              <a:t>Atuação na área</a:t>
+            </a:r>
+            <a:endParaRPr lang="pt-BR" dirty="0"/>
+          </a:p>
+        </p:txBody>
+      </p:sp>
+      <p:sp>
+        <p:nvSpPr>
+          <p:cNvPr id="3" name="Espaço Reservado para Conteúdo 2"/>
+          <p:cNvSpPr>
+            <a:spLocks noGrp="1"/>
+          </p:cNvSpPr>
+          <p:nvPr>
+            <p:ph idx="1"/>
+          </p:nvPr>
+        </p:nvSpPr>
+        <p:spPr/>
+        <p:txBody>
+          <a:bodyPr/>
+          <a:lstStyle/>
+          <a:p>
+            <a:r>
+              <a:rPr lang="pt-BR" dirty="0" smtClean="0"/>
+              <a:t>Tecnólogo em informática – UFPR – 2005</a:t>
+            </a:r>
+          </a:p>
+          <a:p>
+            <a:r>
+              <a:rPr lang="pt-BR" dirty="0" smtClean="0"/>
+              <a:t>Analista de sistema/ Programado – 2003 (GCI, </a:t>
+            </a:r>
+            <a:r>
+              <a:rPr lang="pt-BR" dirty="0" err="1" smtClean="0"/>
+              <a:t>Senior</a:t>
+            </a:r>
+            <a:r>
+              <a:rPr lang="pt-BR" dirty="0" smtClean="0"/>
+              <a:t> Sistema, </a:t>
+            </a:r>
+            <a:r>
+              <a:rPr lang="pt-BR" dirty="0" err="1" smtClean="0"/>
+              <a:t>Lactec</a:t>
+            </a:r>
+            <a:r>
+              <a:rPr lang="pt-BR" dirty="0" smtClean="0"/>
+              <a:t>, EBS, </a:t>
+            </a:r>
+            <a:r>
+              <a:rPr lang="pt-BR" dirty="0" err="1" smtClean="0"/>
+              <a:t>Tortuga</a:t>
+            </a:r>
+            <a:r>
+              <a:rPr lang="pt-BR" dirty="0" smtClean="0"/>
+              <a:t>, Livrarias Curitiba)</a:t>
+            </a:r>
+          </a:p>
+          <a:p>
+            <a:r>
+              <a:rPr lang="pt-BR" dirty="0" err="1" smtClean="0"/>
+              <a:t>Pentaho</a:t>
+            </a:r>
+            <a:r>
+              <a:rPr lang="pt-BR" dirty="0" smtClean="0"/>
+              <a:t> – 2008 – 2013</a:t>
+            </a:r>
+          </a:p>
+          <a:p>
+            <a:r>
+              <a:rPr lang="pt-BR" dirty="0" err="1" smtClean="0"/>
+              <a:t>Qlikview</a:t>
+            </a:r>
+            <a:r>
+              <a:rPr lang="pt-BR" dirty="0" smtClean="0"/>
+              <a:t> – 2008 – 2010 – 2011</a:t>
+            </a:r>
+          </a:p>
+          <a:p>
+            <a:r>
+              <a:rPr lang="pt-BR" dirty="0" err="1"/>
+              <a:t>MicroStrategy</a:t>
+            </a:r>
+            <a:r>
+              <a:rPr lang="pt-BR" dirty="0"/>
+              <a:t> </a:t>
+            </a:r>
+            <a:r>
+              <a:rPr lang="pt-BR" dirty="0" smtClean="0"/>
+              <a:t>- 2013</a:t>
+            </a:r>
+          </a:p>
+          <a:p>
+            <a:r>
+              <a:rPr lang="pt-BR" dirty="0" err="1" smtClean="0"/>
+              <a:t>Cognos</a:t>
+            </a:r>
+            <a:r>
+              <a:rPr lang="pt-BR" dirty="0" smtClean="0"/>
+              <a:t> - 2015</a:t>
+            </a:r>
+          </a:p>
+          <a:p>
+            <a:endParaRPr lang="pt-BR" dirty="0" smtClean="0"/>
+          </a:p>
+          <a:p>
+            <a:endParaRPr lang="pt-BR" dirty="0"/>
+          </a:p>
+        </p:txBody>
+      </p:sp>
+    </p:spTree>
+    <p:extLst>
+      <p:ext uri="{BB962C8B-B14F-4D97-AF65-F5344CB8AC3E}">
+        <p14:creationId xmlns:p14="http://schemas.microsoft.com/office/powerpoint/2010/main" val="3595721544"/>
+      </p:ext>
+    </p:extLst>
+  </p:cSld>
+  <p:clrMapOvr>
+    <a:masterClrMapping/>
+  </p:clrMapOvr>
+  <mc:AlternateContent xmlns:mc="http://schemas.openxmlformats.org/markup-compatibility/2006" xmlns:p14="http://schemas.microsoft.com/office/powerpoint/2010/main">
+    <mc:Choice Requires="p14">
+      <p:transition spd="med" p14:dur="700">
+        <p:fade/>
+      </p:transition>
+    </mc:Choice>
+    <mc:Fallback xmlns="">
+      <p:transition spd="med">
+        <p:fade/>
+      </p:transition>
+    </mc:Fallback>
+  </mc:AlternateContent>
+  <p:timing>
+    <p:tnLst>
+      <p:par>
+        <p:cTn id="1" dur="indefinite" restart="never" nodeType="tmRoot"/>
+      </p:par>
+    </p:tnLst>
+  </p:timing>
+</p:sld>
+</file>
+
+<file path=ppt/slides/slide20.xml><?xml version="1.0" encoding="utf-8"?>
 <p:sld xmlns:a="http://schemas.openxmlformats.org/drawingml/2006/main" xmlns:r="http://schemas.openxmlformats.org/officeDocument/2006/relationships" xmlns:p="http://schemas.openxmlformats.org/presentationml/2006/main">
   <p:cSld>
     <p:spTree>
@@ -4145,165 +4827,29 @@
   <p:clrMapOvr>
     <a:masterClrMapping/>
   </p:clrMapOvr>
+  <mc:AlternateContent xmlns:mc="http://schemas.openxmlformats.org/markup-compatibility/2006" xmlns:p14="http://schemas.microsoft.com/office/powerpoint/2010/main">
+    <mc:Choice Requires="p14">
+      <p:transition spd="med" p14:dur="700">
+        <p:fade/>
+      </p:transition>
+    </mc:Choice>
+    <mc:Fallback xmlns="">
+      <p:transition spd="med">
+        <p:fade/>
+      </p:transition>
+    </mc:Fallback>
+  </mc:AlternateContent>
+  <p:timing>
+    <p:tnLst>
+      <p:par>
+        <p:cTn id="1" dur="indefinite" restart="never" nodeType="tmRoot"/>
+      </p:par>
+    </p:tnLst>
+  </p:timing>
 </p:sld>
 </file>
 
-<file path=ppt/slides/slide2.xml><?xml version="1.0" encoding="utf-8"?>
-<p:sld xmlns:a="http://schemas.openxmlformats.org/drawingml/2006/main" xmlns:r="http://schemas.openxmlformats.org/officeDocument/2006/relationships" xmlns:p="http://schemas.openxmlformats.org/presentationml/2006/main">
-  <p:cSld>
-    <p:spTree>
-      <p:nvGrpSpPr>
-        <p:cNvPr id="1" name=""/>
-        <p:cNvGrpSpPr/>
-        <p:nvPr/>
-      </p:nvGrpSpPr>
-      <p:grpSpPr>
-        <a:xfrm>
-          <a:off x="0" y="0"/>
-          <a:ext cx="0" cy="0"/>
-          <a:chOff x="0" y="0"/>
-          <a:chExt cx="0" cy="0"/>
-        </a:xfrm>
-      </p:grpSpPr>
-      <p:sp>
-        <p:nvSpPr>
-          <p:cNvPr id="2" name="Título 1"/>
-          <p:cNvSpPr>
-            <a:spLocks noGrp="1"/>
-          </p:cNvSpPr>
-          <p:nvPr>
-            <p:ph type="title"/>
-          </p:nvPr>
-        </p:nvSpPr>
-        <p:spPr/>
-        <p:txBody>
-          <a:bodyPr/>
-          <a:lstStyle/>
-          <a:p>
-            <a:r>
-              <a:rPr lang="pt-BR" dirty="0" smtClean="0"/>
-              <a:t>Atuação na área</a:t>
-            </a:r>
-            <a:endParaRPr lang="pt-BR" dirty="0"/>
-          </a:p>
-        </p:txBody>
-      </p:sp>
-      <p:sp>
-        <p:nvSpPr>
-          <p:cNvPr id="3" name="Espaço Reservado para Conteúdo 2"/>
-          <p:cNvSpPr>
-            <a:spLocks noGrp="1"/>
-          </p:cNvSpPr>
-          <p:nvPr>
-            <p:ph idx="1"/>
-          </p:nvPr>
-        </p:nvSpPr>
-        <p:spPr/>
-        <p:txBody>
-          <a:bodyPr/>
-          <a:lstStyle/>
-          <a:p>
-            <a:r>
-              <a:rPr lang="pt-BR" dirty="0" smtClean="0"/>
-              <a:t>Tecnólogo em informática – UFPR – 2005</a:t>
-            </a:r>
-          </a:p>
-          <a:p>
-            <a:r>
-              <a:rPr lang="pt-BR" dirty="0" smtClean="0"/>
-              <a:t>Analista de sistema/ Programado – 2003 (GCI, </a:t>
-            </a:r>
-            <a:r>
-              <a:rPr lang="pt-BR" dirty="0" err="1" smtClean="0"/>
-              <a:t>Senior</a:t>
-            </a:r>
-            <a:r>
-              <a:rPr lang="pt-BR" dirty="0" smtClean="0"/>
-              <a:t> Sistema, </a:t>
-            </a:r>
-            <a:r>
-              <a:rPr lang="pt-BR" dirty="0" err="1" smtClean="0"/>
-              <a:t>Lactec</a:t>
-            </a:r>
-            <a:r>
-              <a:rPr lang="pt-BR" dirty="0" smtClean="0"/>
-              <a:t>, EBS, </a:t>
-            </a:r>
-            <a:r>
-              <a:rPr lang="pt-BR" dirty="0" err="1" smtClean="0"/>
-              <a:t>Tortuga</a:t>
-            </a:r>
-            <a:r>
-              <a:rPr lang="pt-BR" dirty="0" smtClean="0"/>
-              <a:t>, Livrarias Curitiba)</a:t>
-            </a:r>
-          </a:p>
-          <a:p>
-            <a:r>
-              <a:rPr lang="pt-BR" dirty="0" err="1" smtClean="0"/>
-              <a:t>Pentaho</a:t>
-            </a:r>
-            <a:r>
-              <a:rPr lang="pt-BR" dirty="0" smtClean="0"/>
-              <a:t> – 2008 – 2013</a:t>
-            </a:r>
-          </a:p>
-          <a:p>
-            <a:r>
-              <a:rPr lang="pt-BR" dirty="0" err="1" smtClean="0"/>
-              <a:t>Qlikview</a:t>
-            </a:r>
-            <a:r>
-              <a:rPr lang="pt-BR" dirty="0" smtClean="0"/>
-              <a:t> – 2008 – 2010 – 2011</a:t>
-            </a:r>
-          </a:p>
-          <a:p>
-            <a:r>
-              <a:rPr lang="pt-BR" dirty="0" err="1"/>
-              <a:t>MicroStrategy</a:t>
-            </a:r>
-            <a:r>
-              <a:rPr lang="pt-BR" dirty="0"/>
-              <a:t> </a:t>
-            </a:r>
-            <a:r>
-              <a:rPr lang="pt-BR" dirty="0" smtClean="0"/>
-              <a:t>- 2013</a:t>
-            </a:r>
-          </a:p>
-          <a:p>
-            <a:r>
-              <a:rPr lang="pt-BR" dirty="0" err="1" smtClean="0"/>
-              <a:t>Cognos</a:t>
-            </a:r>
-            <a:r>
-              <a:rPr lang="pt-BR" dirty="0" smtClean="0"/>
-              <a:t> - 2015</a:t>
-            </a:r>
-          </a:p>
-          <a:p>
-            <a:endParaRPr lang="pt-BR" dirty="0" smtClean="0"/>
-          </a:p>
-          <a:p>
-            <a:endParaRPr lang="pt-BR" dirty="0"/>
-          </a:p>
-        </p:txBody>
-      </p:sp>
-    </p:spTree>
-    <p:extLst>
-      <p:ext uri="{BB962C8B-B14F-4D97-AF65-F5344CB8AC3E}">
-        <p14:creationId xmlns:p14="http://schemas.microsoft.com/office/powerpoint/2010/main" val="3595721544"/>
-      </p:ext>
-    </p:extLst>
-  </p:cSld>
-  <p:clrMapOvr>
-    <a:masterClrMapping/>
-  </p:clrMapOvr>
-</p:sld>
-</file>
-
-<file path=ppt/slides/slide20.xml><?xml version="1.0" encoding="utf-8"?>
+<file path=ppt/slides/slide21.xml><?xml version="1.0" encoding="utf-8"?>
 <p:sld xmlns:a="http://schemas.openxmlformats.org/drawingml/2006/main" xmlns:r="http://schemas.openxmlformats.org/officeDocument/2006/relationships" xmlns:p="http://schemas.openxmlformats.org/presentationml/2006/main">
   <p:cSld>
     <p:spTree>
@@ -4792,10 +5338,29 @@
   <p:clrMapOvr>
     <a:masterClrMapping/>
   </p:clrMapOvr>
+  <mc:AlternateContent xmlns:mc="http://schemas.openxmlformats.org/markup-compatibility/2006" xmlns:p14="http://schemas.microsoft.com/office/powerpoint/2010/main">
+    <mc:Choice Requires="p14">
+      <p:transition spd="med" p14:dur="700">
+        <p:fade/>
+      </p:transition>
+    </mc:Choice>
+    <mc:Fallback xmlns="">
+      <p:transition spd="med">
+        <p:fade/>
+      </p:transition>
+    </mc:Fallback>
+  </mc:AlternateContent>
+  <p:timing>
+    <p:tnLst>
+      <p:par>
+        <p:cTn id="1" dur="indefinite" restart="never" nodeType="tmRoot"/>
+      </p:par>
+    </p:tnLst>
+  </p:timing>
 </p:sld>
 </file>
 
-<file path=ppt/slides/slide21.xml><?xml version="1.0" encoding="utf-8"?>
+<file path=ppt/slides/slide22.xml><?xml version="1.0" encoding="utf-8"?>
 <p:sld xmlns:a="http://schemas.openxmlformats.org/drawingml/2006/main" xmlns:r="http://schemas.openxmlformats.org/officeDocument/2006/relationships" xmlns:p="http://schemas.openxmlformats.org/presentationml/2006/main">
   <p:cSld>
     <p:spTree>
@@ -4895,6 +5460,25 @@
   <p:clrMapOvr>
     <a:masterClrMapping/>
   </p:clrMapOvr>
+  <mc:AlternateContent xmlns:mc="http://schemas.openxmlformats.org/markup-compatibility/2006" xmlns:p14="http://schemas.microsoft.com/office/powerpoint/2010/main">
+    <mc:Choice Requires="p14">
+      <p:transition spd="med" p14:dur="700">
+        <p:fade/>
+      </p:transition>
+    </mc:Choice>
+    <mc:Fallback xmlns="">
+      <p:transition spd="med">
+        <p:fade/>
+      </p:transition>
+    </mc:Fallback>
+  </mc:AlternateContent>
+  <p:timing>
+    <p:tnLst>
+      <p:par>
+        <p:cTn id="1" dur="indefinite" restart="never" nodeType="tmRoot"/>
+      </p:par>
+    </p:tnLst>
+  </p:timing>
 </p:sld>
 </file>
 
@@ -5142,6 +5726,25 @@
   <p:clrMapOvr>
     <a:masterClrMapping/>
   </p:clrMapOvr>
+  <mc:AlternateContent xmlns:mc="http://schemas.openxmlformats.org/markup-compatibility/2006" xmlns:p14="http://schemas.microsoft.com/office/powerpoint/2010/main">
+    <mc:Choice Requires="p14">
+      <p:transition spd="med" p14:dur="700">
+        <p:fade/>
+      </p:transition>
+    </mc:Choice>
+    <mc:Fallback xmlns="">
+      <p:transition spd="med">
+        <p:fade/>
+      </p:transition>
+    </mc:Fallback>
+  </mc:AlternateContent>
+  <p:timing>
+    <p:tnLst>
+      <p:par>
+        <p:cTn id="1" dur="indefinite" restart="never" nodeType="tmRoot"/>
+      </p:par>
+    </p:tnLst>
+  </p:timing>
 </p:sld>
 </file>
 
@@ -5302,6 +5905,25 @@
   <p:clrMapOvr>
     <a:masterClrMapping/>
   </p:clrMapOvr>
+  <mc:AlternateContent xmlns:mc="http://schemas.openxmlformats.org/markup-compatibility/2006" xmlns:p14="http://schemas.microsoft.com/office/powerpoint/2010/main">
+    <mc:Choice Requires="p14">
+      <p:transition spd="med" p14:dur="700">
+        <p:fade/>
+      </p:transition>
+    </mc:Choice>
+    <mc:Fallback xmlns="">
+      <p:transition spd="med">
+        <p:fade/>
+      </p:transition>
+    </mc:Fallback>
+  </mc:AlternateContent>
+  <p:timing>
+    <p:tnLst>
+      <p:par>
+        <p:cTn id="1" dur="indefinite" restart="never" nodeType="tmRoot"/>
+      </p:par>
+    </p:tnLst>
+  </p:timing>
 </p:sld>
 </file>
 
@@ -5402,6 +6024,25 @@
   <p:clrMapOvr>
     <a:masterClrMapping/>
   </p:clrMapOvr>
+  <mc:AlternateContent xmlns:mc="http://schemas.openxmlformats.org/markup-compatibility/2006" xmlns:p14="http://schemas.microsoft.com/office/powerpoint/2010/main">
+    <mc:Choice Requires="p14">
+      <p:transition spd="med" p14:dur="700">
+        <p:fade/>
+      </p:transition>
+    </mc:Choice>
+    <mc:Fallback xmlns="">
+      <p:transition spd="med">
+        <p:fade/>
+      </p:transition>
+    </mc:Fallback>
+  </mc:AlternateContent>
+  <p:timing>
+    <p:tnLst>
+      <p:par>
+        <p:cTn id="1" dur="indefinite" restart="never" nodeType="tmRoot"/>
+      </p:par>
+    </p:tnLst>
+  </p:timing>
 </p:sld>
 </file>
 
@@ -5538,6 +6179,25 @@
   <p:clrMapOvr>
     <a:masterClrMapping/>
   </p:clrMapOvr>
+  <mc:AlternateContent xmlns:mc="http://schemas.openxmlformats.org/markup-compatibility/2006" xmlns:p14="http://schemas.microsoft.com/office/powerpoint/2010/main">
+    <mc:Choice Requires="p14">
+      <p:transition spd="med" p14:dur="700">
+        <p:fade/>
+      </p:transition>
+    </mc:Choice>
+    <mc:Fallback xmlns="">
+      <p:transition spd="med">
+        <p:fade/>
+      </p:transition>
+    </mc:Fallback>
+  </mc:AlternateContent>
+  <p:timing>
+    <p:tnLst>
+      <p:par>
+        <p:cTn id="1" dur="indefinite" restart="never" nodeType="tmRoot"/>
+      </p:par>
+    </p:tnLst>
+  </p:timing>
 </p:sld>
 </file>
 
@@ -5682,6 +6342,25 @@
   <p:clrMapOvr>
     <a:masterClrMapping/>
   </p:clrMapOvr>
+  <mc:AlternateContent xmlns:mc="http://schemas.openxmlformats.org/markup-compatibility/2006" xmlns:p14="http://schemas.microsoft.com/office/powerpoint/2010/main">
+    <mc:Choice Requires="p14">
+      <p:transition spd="med" p14:dur="700">
+        <p:fade/>
+      </p:transition>
+    </mc:Choice>
+    <mc:Fallback xmlns="">
+      <p:transition spd="med">
+        <p:fade/>
+      </p:transition>
+    </mc:Fallback>
+  </mc:AlternateContent>
+  <p:timing>
+    <p:tnLst>
+      <p:par>
+        <p:cTn id="1" dur="indefinite" restart="never" nodeType="tmRoot"/>
+      </p:par>
+    </p:tnLst>
+  </p:timing>
 </p:sld>
 </file>
 
@@ -5765,6 +6444,25 @@
   <p:clrMapOvr>
     <a:masterClrMapping/>
   </p:clrMapOvr>
+  <mc:AlternateContent xmlns:mc="http://schemas.openxmlformats.org/markup-compatibility/2006" xmlns:p14="http://schemas.microsoft.com/office/powerpoint/2010/main">
+    <mc:Choice Requires="p14">
+      <p:transition spd="med" p14:dur="700">
+        <p:fade/>
+      </p:transition>
+    </mc:Choice>
+    <mc:Fallback xmlns="">
+      <p:transition spd="med">
+        <p:fade/>
+      </p:transition>
+    </mc:Fallback>
+  </mc:AlternateContent>
+  <p:timing>
+    <p:tnLst>
+      <p:par>
+        <p:cTn id="1" dur="indefinite" restart="never" nodeType="tmRoot"/>
+      </p:par>
+    </p:tnLst>
+  </p:timing>
 </p:sld>
 </file>
 
@@ -5872,6 +6570,25 @@
   <p:clrMapOvr>
     <a:masterClrMapping/>
   </p:clrMapOvr>
+  <mc:AlternateContent xmlns:mc="http://schemas.openxmlformats.org/markup-compatibility/2006" xmlns:p14="http://schemas.microsoft.com/office/powerpoint/2010/main">
+    <mc:Choice Requires="p14">
+      <p:transition spd="med" p14:dur="700">
+        <p:fade/>
+      </p:transition>
+    </mc:Choice>
+    <mc:Fallback xmlns="">
+      <p:transition spd="med">
+        <p:fade/>
+      </p:transition>
+    </mc:Fallback>
+  </mc:AlternateContent>
+  <p:timing>
+    <p:tnLst>
+      <p:par>
+        <p:cTn id="1" dur="indefinite" restart="never" nodeType="tmRoot"/>
+      </p:par>
+    </p:tnLst>
+  </p:timing>
 </p:sld>
 </file>
 

</xml_diff>